<commit_message>
update the ppt files
</commit_message>
<xml_diff>
--- a/tutorials/pipelines/tut_a_con_but/vector files/fig04_big.pptx
+++ b/tutorials/pipelines/tut_a_con_but/vector files/fig04_big.pptx
@@ -2,12 +2,12 @@
 <file path=ppt/presentation.xml><?xml version="1.0" encoding="utf-8"?>
 <p:presentation xmlns:a="http://schemas.openxmlformats.org/drawingml/2006/main" xmlns:r="http://schemas.openxmlformats.org/officeDocument/2006/relationships" xmlns:p="http://schemas.openxmlformats.org/presentationml/2006/main" saveSubsetFonts="1">
   <p:sldMasterIdLst>
-    <p:sldMasterId id="2147483684" r:id="rId1"/>
+    <p:sldMasterId id="2147483696" r:id="rId1"/>
   </p:sldMasterIdLst>
   <p:sldIdLst>
     <p:sldId id="256" r:id="rId2"/>
   </p:sldIdLst>
-  <p:sldSz cx="2133600" cy="1728788"/>
+  <p:sldSz cx="8778875" cy="5486400"/>
   <p:notesSz cx="6858000" cy="9144000"/>
   <p:defaultTextStyle>
     <a:defPPr>
@@ -141,15 +141,15 @@
         </p:nvSpPr>
         <p:spPr>
           <a:xfrm>
-            <a:off x="160020" y="282929"/>
-            <a:ext cx="1813560" cy="601874"/>
+            <a:off x="1097360" y="897890"/>
+            <a:ext cx="6584156" cy="1910080"/>
           </a:xfrm>
         </p:spPr>
         <p:txBody>
           <a:bodyPr anchor="b"/>
           <a:lstStyle>
             <a:lvl1pPr algn="ctr">
-              <a:defRPr sz="1400"/>
+              <a:defRPr sz="4321"/>
             </a:lvl1pPr>
           </a:lstStyle>
           <a:p>
@@ -173,8 +173,8 @@
         </p:nvSpPr>
         <p:spPr>
           <a:xfrm>
-            <a:off x="266700" y="908014"/>
-            <a:ext cx="1600200" cy="417390"/>
+            <a:off x="1097360" y="2881630"/>
+            <a:ext cx="6584156" cy="1324610"/>
           </a:xfrm>
         </p:spPr>
         <p:txBody>
@@ -182,39 +182,39 @@
           <a:lstStyle>
             <a:lvl1pPr marL="0" indent="0" algn="ctr">
               <a:buNone/>
-              <a:defRPr sz="560"/>
+              <a:defRPr sz="1728"/>
             </a:lvl1pPr>
-            <a:lvl2pPr marL="106665" indent="0" algn="ctr">
-              <a:buNone/>
-              <a:defRPr sz="467"/>
+            <a:lvl2pPr marL="329230" indent="0" algn="ctr">
+              <a:buNone/>
+              <a:defRPr sz="1440"/>
             </a:lvl2pPr>
-            <a:lvl3pPr marL="213330" indent="0" algn="ctr">
-              <a:buNone/>
-              <a:defRPr sz="420"/>
+            <a:lvl3pPr marL="658459" indent="0" algn="ctr">
+              <a:buNone/>
+              <a:defRPr sz="1296"/>
             </a:lvl3pPr>
-            <a:lvl4pPr marL="319994" indent="0" algn="ctr">
-              <a:buNone/>
-              <a:defRPr sz="373"/>
+            <a:lvl4pPr marL="987689" indent="0" algn="ctr">
+              <a:buNone/>
+              <a:defRPr sz="1152"/>
             </a:lvl4pPr>
-            <a:lvl5pPr marL="426659" indent="0" algn="ctr">
-              <a:buNone/>
-              <a:defRPr sz="373"/>
+            <a:lvl5pPr marL="1316919" indent="0" algn="ctr">
+              <a:buNone/>
+              <a:defRPr sz="1152"/>
             </a:lvl5pPr>
-            <a:lvl6pPr marL="533324" indent="0" algn="ctr">
-              <a:buNone/>
-              <a:defRPr sz="373"/>
+            <a:lvl6pPr marL="1646149" indent="0" algn="ctr">
+              <a:buNone/>
+              <a:defRPr sz="1152"/>
             </a:lvl6pPr>
-            <a:lvl7pPr marL="639989" indent="0" algn="ctr">
-              <a:buNone/>
-              <a:defRPr sz="373"/>
+            <a:lvl7pPr marL="1975378" indent="0" algn="ctr">
+              <a:buNone/>
+              <a:defRPr sz="1152"/>
             </a:lvl7pPr>
-            <a:lvl8pPr marL="746653" indent="0" algn="ctr">
-              <a:buNone/>
-              <a:defRPr sz="373"/>
+            <a:lvl8pPr marL="2304608" indent="0" algn="ctr">
+              <a:buNone/>
+              <a:defRPr sz="1152"/>
             </a:lvl8pPr>
-            <a:lvl9pPr marL="853318" indent="0" algn="ctr">
-              <a:buNone/>
-              <a:defRPr sz="373"/>
+            <a:lvl9pPr marL="2633838" indent="0" algn="ctr">
+              <a:buNone/>
+              <a:defRPr sz="1152"/>
             </a:lvl9pPr>
           </a:lstStyle>
           <a:p>
@@ -243,7 +243,7 @@
           <a:p>
             <a:fld id="{CA1BB51F-BFC6-4DD3-8C2A-5B21FD6F69C3}" type="datetimeFigureOut">
               <a:rPr lang="en-SE" smtClean="0"/>
-              <a:t>2023-09-30</a:t>
+              <a:t>10/01/2023</a:t>
             </a:fld>
             <a:endParaRPr lang="en-SE"/>
           </a:p>
@@ -294,7 +294,7 @@
     </p:spTree>
     <p:extLst>
       <p:ext uri="{BB962C8B-B14F-4D97-AF65-F5344CB8AC3E}">
-        <p14:creationId xmlns:p14="http://schemas.microsoft.com/office/powerpoint/2010/main" val="2524963387"/>
+        <p14:creationId xmlns:p14="http://schemas.microsoft.com/office/powerpoint/2010/main" val="2286907468"/>
       </p:ext>
     </p:extLst>
   </p:cSld>
@@ -413,7 +413,7 @@
           <a:p>
             <a:fld id="{CA1BB51F-BFC6-4DD3-8C2A-5B21FD6F69C3}" type="datetimeFigureOut">
               <a:rPr lang="en-SE" smtClean="0"/>
-              <a:t>2023-09-30</a:t>
+              <a:t>10/01/2023</a:t>
             </a:fld>
             <a:endParaRPr lang="en-SE"/>
           </a:p>
@@ -464,7 +464,7 @@
     </p:spTree>
     <p:extLst>
       <p:ext uri="{BB962C8B-B14F-4D97-AF65-F5344CB8AC3E}">
-        <p14:creationId xmlns:p14="http://schemas.microsoft.com/office/powerpoint/2010/main" val="3946951137"/>
+        <p14:creationId xmlns:p14="http://schemas.microsoft.com/office/powerpoint/2010/main" val="893241620"/>
       </p:ext>
     </p:extLst>
   </p:cSld>
@@ -503,8 +503,8 @@
         </p:nvSpPr>
         <p:spPr>
           <a:xfrm>
-            <a:off x="1526857" y="92042"/>
-            <a:ext cx="460058" cy="1465068"/>
+            <a:off x="6282382" y="292100"/>
+            <a:ext cx="1892945" cy="4649470"/>
           </a:xfrm>
         </p:spPr>
         <p:txBody>
@@ -531,8 +531,8 @@
         </p:nvSpPr>
         <p:spPr>
           <a:xfrm>
-            <a:off x="146685" y="92042"/>
-            <a:ext cx="1353503" cy="1465068"/>
+            <a:off x="603548" y="292100"/>
+            <a:ext cx="5569099" cy="4649470"/>
           </a:xfrm>
         </p:spPr>
         <p:txBody>
@@ -593,7 +593,7 @@
           <a:p>
             <a:fld id="{CA1BB51F-BFC6-4DD3-8C2A-5B21FD6F69C3}" type="datetimeFigureOut">
               <a:rPr lang="en-SE" smtClean="0"/>
-              <a:t>2023-09-30</a:t>
+              <a:t>10/01/2023</a:t>
             </a:fld>
             <a:endParaRPr lang="en-SE"/>
           </a:p>
@@ -644,7 +644,7 @@
     </p:spTree>
     <p:extLst>
       <p:ext uri="{BB962C8B-B14F-4D97-AF65-F5344CB8AC3E}">
-        <p14:creationId xmlns:p14="http://schemas.microsoft.com/office/powerpoint/2010/main" val="4143859637"/>
+        <p14:creationId xmlns:p14="http://schemas.microsoft.com/office/powerpoint/2010/main" val="4057110836"/>
       </p:ext>
     </p:extLst>
   </p:cSld>
@@ -763,7 +763,7 @@
           <a:p>
             <a:fld id="{CA1BB51F-BFC6-4DD3-8C2A-5B21FD6F69C3}" type="datetimeFigureOut">
               <a:rPr lang="en-SE" smtClean="0"/>
-              <a:t>2023-09-30</a:t>
+              <a:t>10/01/2023</a:t>
             </a:fld>
             <a:endParaRPr lang="en-SE"/>
           </a:p>
@@ -814,7 +814,7 @@
     </p:spTree>
     <p:extLst>
       <p:ext uri="{BB962C8B-B14F-4D97-AF65-F5344CB8AC3E}">
-        <p14:creationId xmlns:p14="http://schemas.microsoft.com/office/powerpoint/2010/main" val="167111033"/>
+        <p14:creationId xmlns:p14="http://schemas.microsoft.com/office/powerpoint/2010/main" val="3487789397"/>
       </p:ext>
     </p:extLst>
   </p:cSld>
@@ -853,15 +853,15 @@
         </p:nvSpPr>
         <p:spPr>
           <a:xfrm>
-            <a:off x="145574" y="430997"/>
-            <a:ext cx="1840230" cy="719128"/>
+            <a:off x="598975" y="1367791"/>
+            <a:ext cx="7571780" cy="2282190"/>
           </a:xfrm>
         </p:spPr>
         <p:txBody>
           <a:bodyPr anchor="b"/>
           <a:lstStyle>
             <a:lvl1pPr>
-              <a:defRPr sz="1400"/>
+              <a:defRPr sz="4321"/>
             </a:lvl1pPr>
           </a:lstStyle>
           <a:p>
@@ -885,8 +885,8 @@
         </p:nvSpPr>
         <p:spPr>
           <a:xfrm>
-            <a:off x="145574" y="1156928"/>
-            <a:ext cx="1840230" cy="378172"/>
+            <a:off x="598975" y="3671571"/>
+            <a:ext cx="7571780" cy="1200150"/>
           </a:xfrm>
         </p:spPr>
         <p:txBody>
@@ -894,15 +894,17 @@
           <a:lstStyle>
             <a:lvl1pPr marL="0" indent="0">
               <a:buNone/>
-              <a:defRPr sz="560">
+              <a:defRPr sz="1728">
                 <a:solidFill>
-                  <a:schemeClr val="tx1"/>
+                  <a:schemeClr val="tx1">
+                    <a:tint val="75000"/>
+                  </a:schemeClr>
                 </a:solidFill>
               </a:defRPr>
             </a:lvl1pPr>
-            <a:lvl2pPr marL="106665" indent="0">
-              <a:buNone/>
-              <a:defRPr sz="467">
+            <a:lvl2pPr marL="329230" indent="0">
+              <a:buNone/>
+              <a:defRPr sz="1440">
                 <a:solidFill>
                   <a:schemeClr val="tx1">
                     <a:tint val="75000"/>
@@ -910,9 +912,9 @@
                 </a:solidFill>
               </a:defRPr>
             </a:lvl2pPr>
-            <a:lvl3pPr marL="213330" indent="0">
-              <a:buNone/>
-              <a:defRPr sz="420">
+            <a:lvl3pPr marL="658459" indent="0">
+              <a:buNone/>
+              <a:defRPr sz="1296">
                 <a:solidFill>
                   <a:schemeClr val="tx1">
                     <a:tint val="75000"/>
@@ -920,9 +922,9 @@
                 </a:solidFill>
               </a:defRPr>
             </a:lvl3pPr>
-            <a:lvl4pPr marL="319994" indent="0">
-              <a:buNone/>
-              <a:defRPr sz="373">
+            <a:lvl4pPr marL="987689" indent="0">
+              <a:buNone/>
+              <a:defRPr sz="1152">
                 <a:solidFill>
                   <a:schemeClr val="tx1">
                     <a:tint val="75000"/>
@@ -930,9 +932,9 @@
                 </a:solidFill>
               </a:defRPr>
             </a:lvl4pPr>
-            <a:lvl5pPr marL="426659" indent="0">
-              <a:buNone/>
-              <a:defRPr sz="373">
+            <a:lvl5pPr marL="1316919" indent="0">
+              <a:buNone/>
+              <a:defRPr sz="1152">
                 <a:solidFill>
                   <a:schemeClr val="tx1">
                     <a:tint val="75000"/>
@@ -940,9 +942,9 @@
                 </a:solidFill>
               </a:defRPr>
             </a:lvl5pPr>
-            <a:lvl6pPr marL="533324" indent="0">
-              <a:buNone/>
-              <a:defRPr sz="373">
+            <a:lvl6pPr marL="1646149" indent="0">
+              <a:buNone/>
+              <a:defRPr sz="1152">
                 <a:solidFill>
                   <a:schemeClr val="tx1">
                     <a:tint val="75000"/>
@@ -950,9 +952,9 @@
                 </a:solidFill>
               </a:defRPr>
             </a:lvl6pPr>
-            <a:lvl7pPr marL="639989" indent="0">
-              <a:buNone/>
-              <a:defRPr sz="373">
+            <a:lvl7pPr marL="1975378" indent="0">
+              <a:buNone/>
+              <a:defRPr sz="1152">
                 <a:solidFill>
                   <a:schemeClr val="tx1">
                     <a:tint val="75000"/>
@@ -960,9 +962,9 @@
                 </a:solidFill>
               </a:defRPr>
             </a:lvl7pPr>
-            <a:lvl8pPr marL="746653" indent="0">
-              <a:buNone/>
-              <a:defRPr sz="373">
+            <a:lvl8pPr marL="2304608" indent="0">
+              <a:buNone/>
+              <a:defRPr sz="1152">
                 <a:solidFill>
                   <a:schemeClr val="tx1">
                     <a:tint val="75000"/>
@@ -970,9 +972,9 @@
                 </a:solidFill>
               </a:defRPr>
             </a:lvl8pPr>
-            <a:lvl9pPr marL="853318" indent="0">
-              <a:buNone/>
-              <a:defRPr sz="373">
+            <a:lvl9pPr marL="2633838" indent="0">
+              <a:buNone/>
+              <a:defRPr sz="1152">
                 <a:solidFill>
                   <a:schemeClr val="tx1">
                     <a:tint val="75000"/>
@@ -1007,7 +1009,7 @@
           <a:p>
             <a:fld id="{CA1BB51F-BFC6-4DD3-8C2A-5B21FD6F69C3}" type="datetimeFigureOut">
               <a:rPr lang="en-SE" smtClean="0"/>
-              <a:t>2023-09-30</a:t>
+              <a:t>10/01/2023</a:t>
             </a:fld>
             <a:endParaRPr lang="en-SE"/>
           </a:p>
@@ -1058,7 +1060,7 @@
     </p:spTree>
     <p:extLst>
       <p:ext uri="{BB962C8B-B14F-4D97-AF65-F5344CB8AC3E}">
-        <p14:creationId xmlns:p14="http://schemas.microsoft.com/office/powerpoint/2010/main" val="2958211045"/>
+        <p14:creationId xmlns:p14="http://schemas.microsoft.com/office/powerpoint/2010/main" val="3520788965"/>
       </p:ext>
     </p:extLst>
   </p:cSld>
@@ -1120,8 +1122,8 @@
         </p:nvSpPr>
         <p:spPr>
           <a:xfrm>
-            <a:off x="146685" y="460210"/>
-            <a:ext cx="906780" cy="1096900"/>
+            <a:off x="603548" y="1460500"/>
+            <a:ext cx="3731022" cy="3481070"/>
           </a:xfrm>
         </p:spPr>
         <p:txBody>
@@ -1177,8 +1179,8 @@
         </p:nvSpPr>
         <p:spPr>
           <a:xfrm>
-            <a:off x="1080135" y="460210"/>
-            <a:ext cx="906780" cy="1096900"/>
+            <a:off x="4444305" y="1460500"/>
+            <a:ext cx="3731022" cy="3481070"/>
           </a:xfrm>
         </p:spPr>
         <p:txBody>
@@ -1239,7 +1241,7 @@
           <a:p>
             <a:fld id="{CA1BB51F-BFC6-4DD3-8C2A-5B21FD6F69C3}" type="datetimeFigureOut">
               <a:rPr lang="en-SE" smtClean="0"/>
-              <a:t>2023-09-30</a:t>
+              <a:t>10/01/2023</a:t>
             </a:fld>
             <a:endParaRPr lang="en-SE"/>
           </a:p>
@@ -1290,7 +1292,7 @@
     </p:spTree>
     <p:extLst>
       <p:ext uri="{BB962C8B-B14F-4D97-AF65-F5344CB8AC3E}">
-        <p14:creationId xmlns:p14="http://schemas.microsoft.com/office/powerpoint/2010/main" val="3797410516"/>
+        <p14:creationId xmlns:p14="http://schemas.microsoft.com/office/powerpoint/2010/main" val="1451664713"/>
       </p:ext>
     </p:extLst>
   </p:cSld>
@@ -1329,8 +1331,8 @@
         </p:nvSpPr>
         <p:spPr>
           <a:xfrm>
-            <a:off x="146963" y="92043"/>
-            <a:ext cx="1840230" cy="334152"/>
+            <a:off x="604691" y="292101"/>
+            <a:ext cx="7571780" cy="1060450"/>
           </a:xfrm>
         </p:spPr>
         <p:txBody>
@@ -1357,8 +1359,8 @@
         </p:nvSpPr>
         <p:spPr>
           <a:xfrm>
-            <a:off x="146963" y="423793"/>
-            <a:ext cx="902613" cy="207695"/>
+            <a:off x="604692" y="1344930"/>
+            <a:ext cx="3713875" cy="659130"/>
           </a:xfrm>
         </p:spPr>
         <p:txBody>
@@ -1366,39 +1368,39 @@
           <a:lstStyle>
             <a:lvl1pPr marL="0" indent="0">
               <a:buNone/>
-              <a:defRPr sz="560" b="1"/>
+              <a:defRPr sz="1728" b="1"/>
             </a:lvl1pPr>
-            <a:lvl2pPr marL="106665" indent="0">
-              <a:buNone/>
-              <a:defRPr sz="467" b="1"/>
+            <a:lvl2pPr marL="329230" indent="0">
+              <a:buNone/>
+              <a:defRPr sz="1440" b="1"/>
             </a:lvl2pPr>
-            <a:lvl3pPr marL="213330" indent="0">
-              <a:buNone/>
-              <a:defRPr sz="420" b="1"/>
+            <a:lvl3pPr marL="658459" indent="0">
+              <a:buNone/>
+              <a:defRPr sz="1296" b="1"/>
             </a:lvl3pPr>
-            <a:lvl4pPr marL="319994" indent="0">
-              <a:buNone/>
-              <a:defRPr sz="373" b="1"/>
+            <a:lvl4pPr marL="987689" indent="0">
+              <a:buNone/>
+              <a:defRPr sz="1152" b="1"/>
             </a:lvl4pPr>
-            <a:lvl5pPr marL="426659" indent="0">
-              <a:buNone/>
-              <a:defRPr sz="373" b="1"/>
+            <a:lvl5pPr marL="1316919" indent="0">
+              <a:buNone/>
+              <a:defRPr sz="1152" b="1"/>
             </a:lvl5pPr>
-            <a:lvl6pPr marL="533324" indent="0">
-              <a:buNone/>
-              <a:defRPr sz="373" b="1"/>
+            <a:lvl6pPr marL="1646149" indent="0">
+              <a:buNone/>
+              <a:defRPr sz="1152" b="1"/>
             </a:lvl6pPr>
-            <a:lvl7pPr marL="639989" indent="0">
-              <a:buNone/>
-              <a:defRPr sz="373" b="1"/>
+            <a:lvl7pPr marL="1975378" indent="0">
+              <a:buNone/>
+              <a:defRPr sz="1152" b="1"/>
             </a:lvl7pPr>
-            <a:lvl8pPr marL="746653" indent="0">
-              <a:buNone/>
-              <a:defRPr sz="373" b="1"/>
+            <a:lvl8pPr marL="2304608" indent="0">
+              <a:buNone/>
+              <a:defRPr sz="1152" b="1"/>
             </a:lvl8pPr>
-            <a:lvl9pPr marL="853318" indent="0">
-              <a:buNone/>
-              <a:defRPr sz="373" b="1"/>
+            <a:lvl9pPr marL="2633838" indent="0">
+              <a:buNone/>
+              <a:defRPr sz="1152" b="1"/>
             </a:lvl9pPr>
           </a:lstStyle>
           <a:p>
@@ -1422,8 +1424,8 @@
         </p:nvSpPr>
         <p:spPr>
           <a:xfrm>
-            <a:off x="146963" y="631488"/>
-            <a:ext cx="902613" cy="928823"/>
+            <a:off x="604692" y="2004060"/>
+            <a:ext cx="3713875" cy="2947670"/>
           </a:xfrm>
         </p:spPr>
         <p:txBody>
@@ -1479,8 +1481,8 @@
         </p:nvSpPr>
         <p:spPr>
           <a:xfrm>
-            <a:off x="1080135" y="423793"/>
-            <a:ext cx="907058" cy="207695"/>
+            <a:off x="4444306" y="1344930"/>
+            <a:ext cx="3732165" cy="659130"/>
           </a:xfrm>
         </p:spPr>
         <p:txBody>
@@ -1488,39 +1490,39 @@
           <a:lstStyle>
             <a:lvl1pPr marL="0" indent="0">
               <a:buNone/>
-              <a:defRPr sz="560" b="1"/>
+              <a:defRPr sz="1728" b="1"/>
             </a:lvl1pPr>
-            <a:lvl2pPr marL="106665" indent="0">
-              <a:buNone/>
-              <a:defRPr sz="467" b="1"/>
+            <a:lvl2pPr marL="329230" indent="0">
+              <a:buNone/>
+              <a:defRPr sz="1440" b="1"/>
             </a:lvl2pPr>
-            <a:lvl3pPr marL="213330" indent="0">
-              <a:buNone/>
-              <a:defRPr sz="420" b="1"/>
+            <a:lvl3pPr marL="658459" indent="0">
+              <a:buNone/>
+              <a:defRPr sz="1296" b="1"/>
             </a:lvl3pPr>
-            <a:lvl4pPr marL="319994" indent="0">
-              <a:buNone/>
-              <a:defRPr sz="373" b="1"/>
+            <a:lvl4pPr marL="987689" indent="0">
+              <a:buNone/>
+              <a:defRPr sz="1152" b="1"/>
             </a:lvl4pPr>
-            <a:lvl5pPr marL="426659" indent="0">
-              <a:buNone/>
-              <a:defRPr sz="373" b="1"/>
+            <a:lvl5pPr marL="1316919" indent="0">
+              <a:buNone/>
+              <a:defRPr sz="1152" b="1"/>
             </a:lvl5pPr>
-            <a:lvl6pPr marL="533324" indent="0">
-              <a:buNone/>
-              <a:defRPr sz="373" b="1"/>
+            <a:lvl6pPr marL="1646149" indent="0">
+              <a:buNone/>
+              <a:defRPr sz="1152" b="1"/>
             </a:lvl6pPr>
-            <a:lvl7pPr marL="639989" indent="0">
-              <a:buNone/>
-              <a:defRPr sz="373" b="1"/>
+            <a:lvl7pPr marL="1975378" indent="0">
+              <a:buNone/>
+              <a:defRPr sz="1152" b="1"/>
             </a:lvl7pPr>
-            <a:lvl8pPr marL="746653" indent="0">
-              <a:buNone/>
-              <a:defRPr sz="373" b="1"/>
+            <a:lvl8pPr marL="2304608" indent="0">
+              <a:buNone/>
+              <a:defRPr sz="1152" b="1"/>
             </a:lvl8pPr>
-            <a:lvl9pPr marL="853318" indent="0">
-              <a:buNone/>
-              <a:defRPr sz="373" b="1"/>
+            <a:lvl9pPr marL="2633838" indent="0">
+              <a:buNone/>
+              <a:defRPr sz="1152" b="1"/>
             </a:lvl9pPr>
           </a:lstStyle>
           <a:p>
@@ -1544,8 +1546,8 @@
         </p:nvSpPr>
         <p:spPr>
           <a:xfrm>
-            <a:off x="1080135" y="631488"/>
-            <a:ext cx="907058" cy="928823"/>
+            <a:off x="4444306" y="2004060"/>
+            <a:ext cx="3732165" cy="2947670"/>
           </a:xfrm>
         </p:spPr>
         <p:txBody>
@@ -1606,7 +1608,7 @@
           <a:p>
             <a:fld id="{CA1BB51F-BFC6-4DD3-8C2A-5B21FD6F69C3}" type="datetimeFigureOut">
               <a:rPr lang="en-SE" smtClean="0"/>
-              <a:t>2023-09-30</a:t>
+              <a:t>10/01/2023</a:t>
             </a:fld>
             <a:endParaRPr lang="en-SE"/>
           </a:p>
@@ -1657,7 +1659,7 @@
     </p:spTree>
     <p:extLst>
       <p:ext uri="{BB962C8B-B14F-4D97-AF65-F5344CB8AC3E}">
-        <p14:creationId xmlns:p14="http://schemas.microsoft.com/office/powerpoint/2010/main" val="2754252418"/>
+        <p14:creationId xmlns:p14="http://schemas.microsoft.com/office/powerpoint/2010/main" val="2116188150"/>
       </p:ext>
     </p:extLst>
   </p:cSld>
@@ -1724,7 +1726,7 @@
           <a:p>
             <a:fld id="{CA1BB51F-BFC6-4DD3-8C2A-5B21FD6F69C3}" type="datetimeFigureOut">
               <a:rPr lang="en-SE" smtClean="0"/>
-              <a:t>2023-09-30</a:t>
+              <a:t>10/01/2023</a:t>
             </a:fld>
             <a:endParaRPr lang="en-SE"/>
           </a:p>
@@ -1775,7 +1777,7 @@
     </p:spTree>
     <p:extLst>
       <p:ext uri="{BB962C8B-B14F-4D97-AF65-F5344CB8AC3E}">
-        <p14:creationId xmlns:p14="http://schemas.microsoft.com/office/powerpoint/2010/main" val="3574134668"/>
+        <p14:creationId xmlns:p14="http://schemas.microsoft.com/office/powerpoint/2010/main" val="422802850"/>
       </p:ext>
     </p:extLst>
   </p:cSld>
@@ -1819,7 +1821,7 @@
           <a:p>
             <a:fld id="{CA1BB51F-BFC6-4DD3-8C2A-5B21FD6F69C3}" type="datetimeFigureOut">
               <a:rPr lang="en-SE" smtClean="0"/>
-              <a:t>2023-09-30</a:t>
+              <a:t>10/01/2023</a:t>
             </a:fld>
             <a:endParaRPr lang="en-SE"/>
           </a:p>
@@ -1870,7 +1872,7 @@
     </p:spTree>
     <p:extLst>
       <p:ext uri="{BB962C8B-B14F-4D97-AF65-F5344CB8AC3E}">
-        <p14:creationId xmlns:p14="http://schemas.microsoft.com/office/powerpoint/2010/main" val="817689837"/>
+        <p14:creationId xmlns:p14="http://schemas.microsoft.com/office/powerpoint/2010/main" val="1596911496"/>
       </p:ext>
     </p:extLst>
   </p:cSld>
@@ -1909,15 +1911,15 @@
         </p:nvSpPr>
         <p:spPr>
           <a:xfrm>
-            <a:off x="146963" y="115252"/>
-            <a:ext cx="688142" cy="403384"/>
+            <a:off x="604692" y="365760"/>
+            <a:ext cx="2831415" cy="1280160"/>
           </a:xfrm>
         </p:spPr>
         <p:txBody>
           <a:bodyPr anchor="b"/>
           <a:lstStyle>
             <a:lvl1pPr>
-              <a:defRPr sz="747"/>
+              <a:defRPr sz="2304"/>
             </a:lvl1pPr>
           </a:lstStyle>
           <a:p>
@@ -1941,39 +1943,39 @@
         </p:nvSpPr>
         <p:spPr>
           <a:xfrm>
-            <a:off x="907058" y="248914"/>
-            <a:ext cx="1080135" cy="1228560"/>
+            <a:off x="3732166" y="789940"/>
+            <a:ext cx="4444305" cy="3898900"/>
           </a:xfrm>
         </p:spPr>
         <p:txBody>
           <a:bodyPr/>
           <a:lstStyle>
             <a:lvl1pPr>
-              <a:defRPr sz="747"/>
+              <a:defRPr sz="2304"/>
             </a:lvl1pPr>
             <a:lvl2pPr>
-              <a:defRPr sz="653"/>
+              <a:defRPr sz="2016"/>
             </a:lvl2pPr>
             <a:lvl3pPr>
-              <a:defRPr sz="560"/>
+              <a:defRPr sz="1728"/>
             </a:lvl3pPr>
             <a:lvl4pPr>
-              <a:defRPr sz="467"/>
+              <a:defRPr sz="1440"/>
             </a:lvl4pPr>
             <a:lvl5pPr>
-              <a:defRPr sz="467"/>
+              <a:defRPr sz="1440"/>
             </a:lvl5pPr>
             <a:lvl6pPr>
-              <a:defRPr sz="467"/>
+              <a:defRPr sz="1440"/>
             </a:lvl6pPr>
             <a:lvl7pPr>
-              <a:defRPr sz="467"/>
+              <a:defRPr sz="1440"/>
             </a:lvl7pPr>
             <a:lvl8pPr>
-              <a:defRPr sz="467"/>
+              <a:defRPr sz="1440"/>
             </a:lvl8pPr>
             <a:lvl9pPr>
-              <a:defRPr sz="467"/>
+              <a:defRPr sz="1440"/>
             </a:lvl9pPr>
           </a:lstStyle>
           <a:p>
@@ -2026,8 +2028,8 @@
         </p:nvSpPr>
         <p:spPr>
           <a:xfrm>
-            <a:off x="146963" y="518636"/>
-            <a:ext cx="688142" cy="960838"/>
+            <a:off x="604692" y="1645920"/>
+            <a:ext cx="2831415" cy="3049270"/>
           </a:xfrm>
         </p:spPr>
         <p:txBody>
@@ -2035,39 +2037,39 @@
           <a:lstStyle>
             <a:lvl1pPr marL="0" indent="0">
               <a:buNone/>
-              <a:defRPr sz="373"/>
+              <a:defRPr sz="1152"/>
             </a:lvl1pPr>
-            <a:lvl2pPr marL="106665" indent="0">
-              <a:buNone/>
-              <a:defRPr sz="327"/>
+            <a:lvl2pPr marL="329230" indent="0">
+              <a:buNone/>
+              <a:defRPr sz="1008"/>
             </a:lvl2pPr>
-            <a:lvl3pPr marL="213330" indent="0">
-              <a:buNone/>
-              <a:defRPr sz="280"/>
+            <a:lvl3pPr marL="658459" indent="0">
+              <a:buNone/>
+              <a:defRPr sz="864"/>
             </a:lvl3pPr>
-            <a:lvl4pPr marL="319994" indent="0">
-              <a:buNone/>
-              <a:defRPr sz="233"/>
+            <a:lvl4pPr marL="987689" indent="0">
+              <a:buNone/>
+              <a:defRPr sz="720"/>
             </a:lvl4pPr>
-            <a:lvl5pPr marL="426659" indent="0">
-              <a:buNone/>
-              <a:defRPr sz="233"/>
+            <a:lvl5pPr marL="1316919" indent="0">
+              <a:buNone/>
+              <a:defRPr sz="720"/>
             </a:lvl5pPr>
-            <a:lvl6pPr marL="533324" indent="0">
-              <a:buNone/>
-              <a:defRPr sz="233"/>
+            <a:lvl6pPr marL="1646149" indent="0">
+              <a:buNone/>
+              <a:defRPr sz="720"/>
             </a:lvl6pPr>
-            <a:lvl7pPr marL="639989" indent="0">
-              <a:buNone/>
-              <a:defRPr sz="233"/>
+            <a:lvl7pPr marL="1975378" indent="0">
+              <a:buNone/>
+              <a:defRPr sz="720"/>
             </a:lvl7pPr>
-            <a:lvl8pPr marL="746653" indent="0">
-              <a:buNone/>
-              <a:defRPr sz="233"/>
+            <a:lvl8pPr marL="2304608" indent="0">
+              <a:buNone/>
+              <a:defRPr sz="720"/>
             </a:lvl8pPr>
-            <a:lvl9pPr marL="853318" indent="0">
-              <a:buNone/>
-              <a:defRPr sz="233"/>
+            <a:lvl9pPr marL="2633838" indent="0">
+              <a:buNone/>
+              <a:defRPr sz="720"/>
             </a:lvl9pPr>
           </a:lstStyle>
           <a:p>
@@ -2096,7 +2098,7 @@
           <a:p>
             <a:fld id="{CA1BB51F-BFC6-4DD3-8C2A-5B21FD6F69C3}" type="datetimeFigureOut">
               <a:rPr lang="en-SE" smtClean="0"/>
-              <a:t>2023-09-30</a:t>
+              <a:t>10/01/2023</a:t>
             </a:fld>
             <a:endParaRPr lang="en-SE"/>
           </a:p>
@@ -2147,7 +2149,7 @@
     </p:spTree>
     <p:extLst>
       <p:ext uri="{BB962C8B-B14F-4D97-AF65-F5344CB8AC3E}">
-        <p14:creationId xmlns:p14="http://schemas.microsoft.com/office/powerpoint/2010/main" val="1326331296"/>
+        <p14:creationId xmlns:p14="http://schemas.microsoft.com/office/powerpoint/2010/main" val="2054921963"/>
       </p:ext>
     </p:extLst>
   </p:cSld>
@@ -2186,15 +2188,15 @@
         </p:nvSpPr>
         <p:spPr>
           <a:xfrm>
-            <a:off x="146963" y="115252"/>
-            <a:ext cx="688142" cy="403384"/>
+            <a:off x="604692" y="365760"/>
+            <a:ext cx="2831415" cy="1280160"/>
           </a:xfrm>
         </p:spPr>
         <p:txBody>
           <a:bodyPr anchor="b"/>
           <a:lstStyle>
             <a:lvl1pPr>
-              <a:defRPr sz="747"/>
+              <a:defRPr sz="2304"/>
             </a:lvl1pPr>
           </a:lstStyle>
           <a:p>
@@ -2218,8 +2220,8 @@
         </p:nvSpPr>
         <p:spPr>
           <a:xfrm>
-            <a:off x="907058" y="248914"/>
-            <a:ext cx="1080135" cy="1228560"/>
+            <a:off x="3732166" y="789940"/>
+            <a:ext cx="4444305" cy="3898900"/>
           </a:xfrm>
         </p:spPr>
         <p:txBody>
@@ -2227,39 +2229,39 @@
           <a:lstStyle>
             <a:lvl1pPr marL="0" indent="0">
               <a:buNone/>
-              <a:defRPr sz="747"/>
+              <a:defRPr sz="2304"/>
             </a:lvl1pPr>
-            <a:lvl2pPr marL="106665" indent="0">
-              <a:buNone/>
-              <a:defRPr sz="653"/>
+            <a:lvl2pPr marL="329230" indent="0">
+              <a:buNone/>
+              <a:defRPr sz="2016"/>
             </a:lvl2pPr>
-            <a:lvl3pPr marL="213330" indent="0">
-              <a:buNone/>
-              <a:defRPr sz="560"/>
+            <a:lvl3pPr marL="658459" indent="0">
+              <a:buNone/>
+              <a:defRPr sz="1728"/>
             </a:lvl3pPr>
-            <a:lvl4pPr marL="319994" indent="0">
-              <a:buNone/>
-              <a:defRPr sz="467"/>
+            <a:lvl4pPr marL="987689" indent="0">
+              <a:buNone/>
+              <a:defRPr sz="1440"/>
             </a:lvl4pPr>
-            <a:lvl5pPr marL="426659" indent="0">
-              <a:buNone/>
-              <a:defRPr sz="467"/>
+            <a:lvl5pPr marL="1316919" indent="0">
+              <a:buNone/>
+              <a:defRPr sz="1440"/>
             </a:lvl5pPr>
-            <a:lvl6pPr marL="533324" indent="0">
-              <a:buNone/>
-              <a:defRPr sz="467"/>
+            <a:lvl6pPr marL="1646149" indent="0">
+              <a:buNone/>
+              <a:defRPr sz="1440"/>
             </a:lvl6pPr>
-            <a:lvl7pPr marL="639989" indent="0">
-              <a:buNone/>
-              <a:defRPr sz="467"/>
+            <a:lvl7pPr marL="1975378" indent="0">
+              <a:buNone/>
+              <a:defRPr sz="1440"/>
             </a:lvl7pPr>
-            <a:lvl8pPr marL="746653" indent="0">
-              <a:buNone/>
-              <a:defRPr sz="467"/>
+            <a:lvl8pPr marL="2304608" indent="0">
+              <a:buNone/>
+              <a:defRPr sz="1440"/>
             </a:lvl8pPr>
-            <a:lvl9pPr marL="853318" indent="0">
-              <a:buNone/>
-              <a:defRPr sz="467"/>
+            <a:lvl9pPr marL="2633838" indent="0">
+              <a:buNone/>
+              <a:defRPr sz="1440"/>
             </a:lvl9pPr>
           </a:lstStyle>
           <a:p>
@@ -2283,8 +2285,8 @@
         </p:nvSpPr>
         <p:spPr>
           <a:xfrm>
-            <a:off x="146963" y="518636"/>
-            <a:ext cx="688142" cy="960838"/>
+            <a:off x="604692" y="1645920"/>
+            <a:ext cx="2831415" cy="3049270"/>
           </a:xfrm>
         </p:spPr>
         <p:txBody>
@@ -2292,39 +2294,39 @@
           <a:lstStyle>
             <a:lvl1pPr marL="0" indent="0">
               <a:buNone/>
-              <a:defRPr sz="373"/>
+              <a:defRPr sz="1152"/>
             </a:lvl1pPr>
-            <a:lvl2pPr marL="106665" indent="0">
-              <a:buNone/>
-              <a:defRPr sz="327"/>
+            <a:lvl2pPr marL="329230" indent="0">
+              <a:buNone/>
+              <a:defRPr sz="1008"/>
             </a:lvl2pPr>
-            <a:lvl3pPr marL="213330" indent="0">
-              <a:buNone/>
-              <a:defRPr sz="280"/>
+            <a:lvl3pPr marL="658459" indent="0">
+              <a:buNone/>
+              <a:defRPr sz="864"/>
             </a:lvl3pPr>
-            <a:lvl4pPr marL="319994" indent="0">
-              <a:buNone/>
-              <a:defRPr sz="233"/>
+            <a:lvl4pPr marL="987689" indent="0">
+              <a:buNone/>
+              <a:defRPr sz="720"/>
             </a:lvl4pPr>
-            <a:lvl5pPr marL="426659" indent="0">
-              <a:buNone/>
-              <a:defRPr sz="233"/>
+            <a:lvl5pPr marL="1316919" indent="0">
+              <a:buNone/>
+              <a:defRPr sz="720"/>
             </a:lvl5pPr>
-            <a:lvl6pPr marL="533324" indent="0">
-              <a:buNone/>
-              <a:defRPr sz="233"/>
+            <a:lvl6pPr marL="1646149" indent="0">
+              <a:buNone/>
+              <a:defRPr sz="720"/>
             </a:lvl6pPr>
-            <a:lvl7pPr marL="639989" indent="0">
-              <a:buNone/>
-              <a:defRPr sz="233"/>
+            <a:lvl7pPr marL="1975378" indent="0">
+              <a:buNone/>
+              <a:defRPr sz="720"/>
             </a:lvl7pPr>
-            <a:lvl8pPr marL="746653" indent="0">
-              <a:buNone/>
-              <a:defRPr sz="233"/>
+            <a:lvl8pPr marL="2304608" indent="0">
+              <a:buNone/>
+              <a:defRPr sz="720"/>
             </a:lvl8pPr>
-            <a:lvl9pPr marL="853318" indent="0">
-              <a:buNone/>
-              <a:defRPr sz="233"/>
+            <a:lvl9pPr marL="2633838" indent="0">
+              <a:buNone/>
+              <a:defRPr sz="720"/>
             </a:lvl9pPr>
           </a:lstStyle>
           <a:p>
@@ -2353,7 +2355,7 @@
           <a:p>
             <a:fld id="{CA1BB51F-BFC6-4DD3-8C2A-5B21FD6F69C3}" type="datetimeFigureOut">
               <a:rPr lang="en-SE" smtClean="0"/>
-              <a:t>2023-09-30</a:t>
+              <a:t>10/01/2023</a:t>
             </a:fld>
             <a:endParaRPr lang="en-SE"/>
           </a:p>
@@ -2404,7 +2406,7 @@
     </p:spTree>
     <p:extLst>
       <p:ext uri="{BB962C8B-B14F-4D97-AF65-F5344CB8AC3E}">
-        <p14:creationId xmlns:p14="http://schemas.microsoft.com/office/powerpoint/2010/main" val="3190310568"/>
+        <p14:creationId xmlns:p14="http://schemas.microsoft.com/office/powerpoint/2010/main" val="1905789695"/>
       </p:ext>
     </p:extLst>
   </p:cSld>
@@ -2448,8 +2450,8 @@
         </p:nvSpPr>
         <p:spPr>
           <a:xfrm>
-            <a:off x="146685" y="92043"/>
-            <a:ext cx="1840230" cy="334152"/>
+            <a:off x="603548" y="292101"/>
+            <a:ext cx="7571780" cy="1060450"/>
           </a:xfrm>
           <a:prstGeom prst="rect">
             <a:avLst/>
@@ -2481,8 +2483,8 @@
         </p:nvSpPr>
         <p:spPr>
           <a:xfrm>
-            <a:off x="146685" y="460210"/>
-            <a:ext cx="1840230" cy="1096900"/>
+            <a:off x="603548" y="1460500"/>
+            <a:ext cx="7571780" cy="3481070"/>
           </a:xfrm>
           <a:prstGeom prst="rect">
             <a:avLst/>
@@ -2543,8 +2545,8 @@
         </p:nvSpPr>
         <p:spPr>
           <a:xfrm>
-            <a:off x="146685" y="1602331"/>
-            <a:ext cx="480060" cy="92042"/>
+            <a:off x="603548" y="5085080"/>
+            <a:ext cx="1975247" cy="292100"/>
           </a:xfrm>
           <a:prstGeom prst="rect">
             <a:avLst/>
@@ -2554,7 +2556,7 @@
           <a:bodyPr vert="horz" lIns="91440" tIns="45720" rIns="91440" bIns="45720" rtlCol="0" anchor="ctr"/>
           <a:lstStyle>
             <a:lvl1pPr algn="l">
-              <a:defRPr sz="280">
+              <a:defRPr sz="864">
                 <a:solidFill>
                   <a:schemeClr val="tx1">
                     <a:tint val="75000"/>
@@ -2566,7 +2568,7 @@
           <a:p>
             <a:fld id="{CA1BB51F-BFC6-4DD3-8C2A-5B21FD6F69C3}" type="datetimeFigureOut">
               <a:rPr lang="en-SE" smtClean="0"/>
-              <a:t>2023-09-30</a:t>
+              <a:t>10/01/2023</a:t>
             </a:fld>
             <a:endParaRPr lang="en-SE"/>
           </a:p>
@@ -2584,8 +2586,8 @@
         </p:nvSpPr>
         <p:spPr>
           <a:xfrm>
-            <a:off x="706755" y="1602331"/>
-            <a:ext cx="720090" cy="92042"/>
+            <a:off x="2908003" y="5085080"/>
+            <a:ext cx="2962870" cy="292100"/>
           </a:xfrm>
           <a:prstGeom prst="rect">
             <a:avLst/>
@@ -2595,7 +2597,7 @@
           <a:bodyPr vert="horz" lIns="91440" tIns="45720" rIns="91440" bIns="45720" rtlCol="0" anchor="ctr"/>
           <a:lstStyle>
             <a:lvl1pPr algn="ctr">
-              <a:defRPr sz="280">
+              <a:defRPr sz="864">
                 <a:solidFill>
                   <a:schemeClr val="tx1">
                     <a:tint val="75000"/>
@@ -2621,8 +2623,8 @@
         </p:nvSpPr>
         <p:spPr>
           <a:xfrm>
-            <a:off x="1506855" y="1602331"/>
-            <a:ext cx="480060" cy="92042"/>
+            <a:off x="6200080" y="5085080"/>
+            <a:ext cx="1975247" cy="292100"/>
           </a:xfrm>
           <a:prstGeom prst="rect">
             <a:avLst/>
@@ -2632,7 +2634,7 @@
           <a:bodyPr vert="horz" lIns="91440" tIns="45720" rIns="91440" bIns="45720" rtlCol="0" anchor="ctr"/>
           <a:lstStyle>
             <a:lvl1pPr algn="r">
-              <a:defRPr sz="280">
+              <a:defRPr sz="864">
                 <a:solidFill>
                   <a:schemeClr val="tx1">
                     <a:tint val="75000"/>
@@ -2653,27 +2655,27 @@
     </p:spTree>
     <p:extLst>
       <p:ext uri="{BB962C8B-B14F-4D97-AF65-F5344CB8AC3E}">
-        <p14:creationId xmlns:p14="http://schemas.microsoft.com/office/powerpoint/2010/main" val="4196870786"/>
+        <p14:creationId xmlns:p14="http://schemas.microsoft.com/office/powerpoint/2010/main" val="1570273775"/>
       </p:ext>
     </p:extLst>
   </p:cSld>
   <p:clrMap bg1="lt1" tx1="dk1" bg2="lt2" tx2="dk2" accent1="accent1" accent2="accent2" accent3="accent3" accent4="accent4" accent5="accent5" accent6="accent6" hlink="hlink" folHlink="folHlink"/>
   <p:sldLayoutIdLst>
-    <p:sldLayoutId id="2147483685" r:id="rId1"/>
-    <p:sldLayoutId id="2147483686" r:id="rId2"/>
-    <p:sldLayoutId id="2147483687" r:id="rId3"/>
-    <p:sldLayoutId id="2147483688" r:id="rId4"/>
-    <p:sldLayoutId id="2147483689" r:id="rId5"/>
-    <p:sldLayoutId id="2147483690" r:id="rId6"/>
-    <p:sldLayoutId id="2147483691" r:id="rId7"/>
-    <p:sldLayoutId id="2147483692" r:id="rId8"/>
-    <p:sldLayoutId id="2147483693" r:id="rId9"/>
-    <p:sldLayoutId id="2147483694" r:id="rId10"/>
-    <p:sldLayoutId id="2147483695" r:id="rId11"/>
+    <p:sldLayoutId id="2147483697" r:id="rId1"/>
+    <p:sldLayoutId id="2147483698" r:id="rId2"/>
+    <p:sldLayoutId id="2147483699" r:id="rId3"/>
+    <p:sldLayoutId id="2147483700" r:id="rId4"/>
+    <p:sldLayoutId id="2147483701" r:id="rId5"/>
+    <p:sldLayoutId id="2147483702" r:id="rId6"/>
+    <p:sldLayoutId id="2147483703" r:id="rId7"/>
+    <p:sldLayoutId id="2147483704" r:id="rId8"/>
+    <p:sldLayoutId id="2147483705" r:id="rId9"/>
+    <p:sldLayoutId id="2147483706" r:id="rId10"/>
+    <p:sldLayoutId id="2147483707" r:id="rId11"/>
   </p:sldLayoutIdLst>
   <p:txStyles>
     <p:titleStyle>
-      <a:lvl1pPr algn="l" defTabSz="213330" rtl="0" eaLnBrk="1" latinLnBrk="0" hangingPunct="1">
+      <a:lvl1pPr algn="l" defTabSz="658459" rtl="0" eaLnBrk="1" latinLnBrk="0" hangingPunct="1">
         <a:lnSpc>
           <a:spcPct val="90000"/>
         </a:lnSpc>
@@ -2681,7 +2683,7 @@
           <a:spcPct val="0"/>
         </a:spcBef>
         <a:buNone/>
-        <a:defRPr sz="1027" kern="1200">
+        <a:defRPr sz="3168" kern="1200">
           <a:solidFill>
             <a:schemeClr val="tx1"/>
           </a:solidFill>
@@ -2692,16 +2694,16 @@
       </a:lvl1pPr>
     </p:titleStyle>
     <p:bodyStyle>
-      <a:lvl1pPr marL="53332" indent="-53332" algn="l" defTabSz="213330" rtl="0" eaLnBrk="1" latinLnBrk="0" hangingPunct="1">
+      <a:lvl1pPr marL="164615" indent="-164615" algn="l" defTabSz="658459" rtl="0" eaLnBrk="1" latinLnBrk="0" hangingPunct="1">
         <a:lnSpc>
           <a:spcPct val="90000"/>
         </a:lnSpc>
         <a:spcBef>
-          <a:spcPts val="233"/>
+          <a:spcPts val="720"/>
         </a:spcBef>
         <a:buFont typeface="Arial" panose="020B0604020202020204" pitchFamily="34" charset="0"/>
         <a:buChar char="•"/>
-        <a:defRPr sz="653" kern="1200">
+        <a:defRPr sz="2016" kern="1200">
           <a:solidFill>
             <a:schemeClr val="tx1"/>
           </a:solidFill>
@@ -2710,16 +2712,16 @@
           <a:cs typeface="+mn-cs"/>
         </a:defRPr>
       </a:lvl1pPr>
-      <a:lvl2pPr marL="159997" indent="-53332" algn="l" defTabSz="213330" rtl="0" eaLnBrk="1" latinLnBrk="0" hangingPunct="1">
+      <a:lvl2pPr marL="493845" indent="-164615" algn="l" defTabSz="658459" rtl="0" eaLnBrk="1" latinLnBrk="0" hangingPunct="1">
         <a:lnSpc>
           <a:spcPct val="90000"/>
         </a:lnSpc>
         <a:spcBef>
-          <a:spcPts val="117"/>
+          <a:spcPts val="360"/>
         </a:spcBef>
         <a:buFont typeface="Arial" panose="020B0604020202020204" pitchFamily="34" charset="0"/>
         <a:buChar char="•"/>
-        <a:defRPr sz="560" kern="1200">
+        <a:defRPr sz="1728" kern="1200">
           <a:solidFill>
             <a:schemeClr val="tx1"/>
           </a:solidFill>
@@ -2728,16 +2730,16 @@
           <a:cs typeface="+mn-cs"/>
         </a:defRPr>
       </a:lvl2pPr>
-      <a:lvl3pPr marL="266662" indent="-53332" algn="l" defTabSz="213330" rtl="0" eaLnBrk="1" latinLnBrk="0" hangingPunct="1">
+      <a:lvl3pPr marL="823074" indent="-164615" algn="l" defTabSz="658459" rtl="0" eaLnBrk="1" latinLnBrk="0" hangingPunct="1">
         <a:lnSpc>
           <a:spcPct val="90000"/>
         </a:lnSpc>
         <a:spcBef>
-          <a:spcPts val="117"/>
+          <a:spcPts val="360"/>
         </a:spcBef>
         <a:buFont typeface="Arial" panose="020B0604020202020204" pitchFamily="34" charset="0"/>
         <a:buChar char="•"/>
-        <a:defRPr sz="467" kern="1200">
+        <a:defRPr sz="1440" kern="1200">
           <a:solidFill>
             <a:schemeClr val="tx1"/>
           </a:solidFill>
@@ -2746,16 +2748,16 @@
           <a:cs typeface="+mn-cs"/>
         </a:defRPr>
       </a:lvl3pPr>
-      <a:lvl4pPr marL="373327" indent="-53332" algn="l" defTabSz="213330" rtl="0" eaLnBrk="1" latinLnBrk="0" hangingPunct="1">
+      <a:lvl4pPr marL="1152304" indent="-164615" algn="l" defTabSz="658459" rtl="0" eaLnBrk="1" latinLnBrk="0" hangingPunct="1">
         <a:lnSpc>
           <a:spcPct val="90000"/>
         </a:lnSpc>
         <a:spcBef>
-          <a:spcPts val="117"/>
+          <a:spcPts val="360"/>
         </a:spcBef>
         <a:buFont typeface="Arial" panose="020B0604020202020204" pitchFamily="34" charset="0"/>
         <a:buChar char="•"/>
-        <a:defRPr sz="420" kern="1200">
+        <a:defRPr sz="1296" kern="1200">
           <a:solidFill>
             <a:schemeClr val="tx1"/>
           </a:solidFill>
@@ -2764,16 +2766,16 @@
           <a:cs typeface="+mn-cs"/>
         </a:defRPr>
       </a:lvl4pPr>
-      <a:lvl5pPr marL="479991" indent="-53332" algn="l" defTabSz="213330" rtl="0" eaLnBrk="1" latinLnBrk="0" hangingPunct="1">
+      <a:lvl5pPr marL="1481534" indent="-164615" algn="l" defTabSz="658459" rtl="0" eaLnBrk="1" latinLnBrk="0" hangingPunct="1">
         <a:lnSpc>
           <a:spcPct val="90000"/>
         </a:lnSpc>
         <a:spcBef>
-          <a:spcPts val="117"/>
+          <a:spcPts val="360"/>
         </a:spcBef>
         <a:buFont typeface="Arial" panose="020B0604020202020204" pitchFamily="34" charset="0"/>
         <a:buChar char="•"/>
-        <a:defRPr sz="420" kern="1200">
+        <a:defRPr sz="1296" kern="1200">
           <a:solidFill>
             <a:schemeClr val="tx1"/>
           </a:solidFill>
@@ -2782,16 +2784,16 @@
           <a:cs typeface="+mn-cs"/>
         </a:defRPr>
       </a:lvl5pPr>
-      <a:lvl6pPr marL="586656" indent="-53332" algn="l" defTabSz="213330" rtl="0" eaLnBrk="1" latinLnBrk="0" hangingPunct="1">
+      <a:lvl6pPr marL="1810763" indent="-164615" algn="l" defTabSz="658459" rtl="0" eaLnBrk="1" latinLnBrk="0" hangingPunct="1">
         <a:lnSpc>
           <a:spcPct val="90000"/>
         </a:lnSpc>
         <a:spcBef>
-          <a:spcPts val="117"/>
+          <a:spcPts val="360"/>
         </a:spcBef>
         <a:buFont typeface="Arial" panose="020B0604020202020204" pitchFamily="34" charset="0"/>
         <a:buChar char="•"/>
-        <a:defRPr sz="420" kern="1200">
+        <a:defRPr sz="1296" kern="1200">
           <a:solidFill>
             <a:schemeClr val="tx1"/>
           </a:solidFill>
@@ -2800,16 +2802,16 @@
           <a:cs typeface="+mn-cs"/>
         </a:defRPr>
       </a:lvl6pPr>
-      <a:lvl7pPr marL="693321" indent="-53332" algn="l" defTabSz="213330" rtl="0" eaLnBrk="1" latinLnBrk="0" hangingPunct="1">
+      <a:lvl7pPr marL="2139993" indent="-164615" algn="l" defTabSz="658459" rtl="0" eaLnBrk="1" latinLnBrk="0" hangingPunct="1">
         <a:lnSpc>
           <a:spcPct val="90000"/>
         </a:lnSpc>
         <a:spcBef>
-          <a:spcPts val="117"/>
+          <a:spcPts val="360"/>
         </a:spcBef>
         <a:buFont typeface="Arial" panose="020B0604020202020204" pitchFamily="34" charset="0"/>
         <a:buChar char="•"/>
-        <a:defRPr sz="420" kern="1200">
+        <a:defRPr sz="1296" kern="1200">
           <a:solidFill>
             <a:schemeClr val="tx1"/>
           </a:solidFill>
@@ -2818,16 +2820,16 @@
           <a:cs typeface="+mn-cs"/>
         </a:defRPr>
       </a:lvl7pPr>
-      <a:lvl8pPr marL="799986" indent="-53332" algn="l" defTabSz="213330" rtl="0" eaLnBrk="1" latinLnBrk="0" hangingPunct="1">
+      <a:lvl8pPr marL="2469223" indent="-164615" algn="l" defTabSz="658459" rtl="0" eaLnBrk="1" latinLnBrk="0" hangingPunct="1">
         <a:lnSpc>
           <a:spcPct val="90000"/>
         </a:lnSpc>
         <a:spcBef>
-          <a:spcPts val="117"/>
+          <a:spcPts val="360"/>
         </a:spcBef>
         <a:buFont typeface="Arial" panose="020B0604020202020204" pitchFamily="34" charset="0"/>
         <a:buChar char="•"/>
-        <a:defRPr sz="420" kern="1200">
+        <a:defRPr sz="1296" kern="1200">
           <a:solidFill>
             <a:schemeClr val="tx1"/>
           </a:solidFill>
@@ -2836,16 +2838,16 @@
           <a:cs typeface="+mn-cs"/>
         </a:defRPr>
       </a:lvl8pPr>
-      <a:lvl9pPr marL="906650" indent="-53332" algn="l" defTabSz="213330" rtl="0" eaLnBrk="1" latinLnBrk="0" hangingPunct="1">
+      <a:lvl9pPr marL="2798453" indent="-164615" algn="l" defTabSz="658459" rtl="0" eaLnBrk="1" latinLnBrk="0" hangingPunct="1">
         <a:lnSpc>
           <a:spcPct val="90000"/>
         </a:lnSpc>
         <a:spcBef>
-          <a:spcPts val="117"/>
+          <a:spcPts val="360"/>
         </a:spcBef>
         <a:buFont typeface="Arial" panose="020B0604020202020204" pitchFamily="34" charset="0"/>
         <a:buChar char="•"/>
-        <a:defRPr sz="420" kern="1200">
+        <a:defRPr sz="1296" kern="1200">
           <a:solidFill>
             <a:schemeClr val="tx1"/>
           </a:solidFill>
@@ -2859,8 +2861,8 @@
       <a:defPPr>
         <a:defRPr lang="en-US"/>
       </a:defPPr>
-      <a:lvl1pPr marL="0" algn="l" defTabSz="213330" rtl="0" eaLnBrk="1" latinLnBrk="0" hangingPunct="1">
-        <a:defRPr sz="420" kern="1200">
+      <a:lvl1pPr marL="0" algn="l" defTabSz="658459" rtl="0" eaLnBrk="1" latinLnBrk="0" hangingPunct="1">
+        <a:defRPr sz="1296" kern="1200">
           <a:solidFill>
             <a:schemeClr val="tx1"/>
           </a:solidFill>
@@ -2869,8 +2871,8 @@
           <a:cs typeface="+mn-cs"/>
         </a:defRPr>
       </a:lvl1pPr>
-      <a:lvl2pPr marL="106665" algn="l" defTabSz="213330" rtl="0" eaLnBrk="1" latinLnBrk="0" hangingPunct="1">
-        <a:defRPr sz="420" kern="1200">
+      <a:lvl2pPr marL="329230" algn="l" defTabSz="658459" rtl="0" eaLnBrk="1" latinLnBrk="0" hangingPunct="1">
+        <a:defRPr sz="1296" kern="1200">
           <a:solidFill>
             <a:schemeClr val="tx1"/>
           </a:solidFill>
@@ -2879,8 +2881,8 @@
           <a:cs typeface="+mn-cs"/>
         </a:defRPr>
       </a:lvl2pPr>
-      <a:lvl3pPr marL="213330" algn="l" defTabSz="213330" rtl="0" eaLnBrk="1" latinLnBrk="0" hangingPunct="1">
-        <a:defRPr sz="420" kern="1200">
+      <a:lvl3pPr marL="658459" algn="l" defTabSz="658459" rtl="0" eaLnBrk="1" latinLnBrk="0" hangingPunct="1">
+        <a:defRPr sz="1296" kern="1200">
           <a:solidFill>
             <a:schemeClr val="tx1"/>
           </a:solidFill>
@@ -2889,8 +2891,8 @@
           <a:cs typeface="+mn-cs"/>
         </a:defRPr>
       </a:lvl3pPr>
-      <a:lvl4pPr marL="319994" algn="l" defTabSz="213330" rtl="0" eaLnBrk="1" latinLnBrk="0" hangingPunct="1">
-        <a:defRPr sz="420" kern="1200">
+      <a:lvl4pPr marL="987689" algn="l" defTabSz="658459" rtl="0" eaLnBrk="1" latinLnBrk="0" hangingPunct="1">
+        <a:defRPr sz="1296" kern="1200">
           <a:solidFill>
             <a:schemeClr val="tx1"/>
           </a:solidFill>
@@ -2899,8 +2901,8 @@
           <a:cs typeface="+mn-cs"/>
         </a:defRPr>
       </a:lvl4pPr>
-      <a:lvl5pPr marL="426659" algn="l" defTabSz="213330" rtl="0" eaLnBrk="1" latinLnBrk="0" hangingPunct="1">
-        <a:defRPr sz="420" kern="1200">
+      <a:lvl5pPr marL="1316919" algn="l" defTabSz="658459" rtl="0" eaLnBrk="1" latinLnBrk="0" hangingPunct="1">
+        <a:defRPr sz="1296" kern="1200">
           <a:solidFill>
             <a:schemeClr val="tx1"/>
           </a:solidFill>
@@ -2909,8 +2911,8 @@
           <a:cs typeface="+mn-cs"/>
         </a:defRPr>
       </a:lvl5pPr>
-      <a:lvl6pPr marL="533324" algn="l" defTabSz="213330" rtl="0" eaLnBrk="1" latinLnBrk="0" hangingPunct="1">
-        <a:defRPr sz="420" kern="1200">
+      <a:lvl6pPr marL="1646149" algn="l" defTabSz="658459" rtl="0" eaLnBrk="1" latinLnBrk="0" hangingPunct="1">
+        <a:defRPr sz="1296" kern="1200">
           <a:solidFill>
             <a:schemeClr val="tx1"/>
           </a:solidFill>
@@ -2919,8 +2921,8 @@
           <a:cs typeface="+mn-cs"/>
         </a:defRPr>
       </a:lvl6pPr>
-      <a:lvl7pPr marL="639989" algn="l" defTabSz="213330" rtl="0" eaLnBrk="1" latinLnBrk="0" hangingPunct="1">
-        <a:defRPr sz="420" kern="1200">
+      <a:lvl7pPr marL="1975378" algn="l" defTabSz="658459" rtl="0" eaLnBrk="1" latinLnBrk="0" hangingPunct="1">
+        <a:defRPr sz="1296" kern="1200">
           <a:solidFill>
             <a:schemeClr val="tx1"/>
           </a:solidFill>
@@ -2929,8 +2931,8 @@
           <a:cs typeface="+mn-cs"/>
         </a:defRPr>
       </a:lvl7pPr>
-      <a:lvl8pPr marL="746653" algn="l" defTabSz="213330" rtl="0" eaLnBrk="1" latinLnBrk="0" hangingPunct="1">
-        <a:defRPr sz="420" kern="1200">
+      <a:lvl8pPr marL="2304608" algn="l" defTabSz="658459" rtl="0" eaLnBrk="1" latinLnBrk="0" hangingPunct="1">
+        <a:defRPr sz="1296" kern="1200">
           <a:solidFill>
             <a:schemeClr val="tx1"/>
           </a:solidFill>
@@ -2939,8 +2941,8 @@
           <a:cs typeface="+mn-cs"/>
         </a:defRPr>
       </a:lvl8pPr>
-      <a:lvl9pPr marL="853318" algn="l" defTabSz="213330" rtl="0" eaLnBrk="1" latinLnBrk="0" hangingPunct="1">
-        <a:defRPr sz="420" kern="1200">
+      <a:lvl9pPr marL="2633838" algn="l" defTabSz="658459" rtl="0" eaLnBrk="1" latinLnBrk="0" hangingPunct="1">
+        <a:defRPr sz="1296" kern="1200">
           <a:solidFill>
             <a:schemeClr val="tx1"/>
           </a:solidFill>
@@ -2971,12 +2973,122 @@
           <a:chExt cx="0" cy="0"/>
         </a:xfrm>
       </p:grpSpPr>
+      <p:grpSp>
+        <p:nvGrpSpPr>
+          <p:cNvPr id="19" name="Group 18">
+            <a:extLst>
+              <a:ext uri="{FF2B5EF4-FFF2-40B4-BE49-F238E27FC236}">
+                <a16:creationId xmlns:a16="http://schemas.microsoft.com/office/drawing/2014/main" id="{DD3BF7E7-486D-A58F-5D27-7AB0FE86EC22}"/>
+              </a:ext>
+            </a:extLst>
+          </p:cNvPr>
+          <p:cNvGrpSpPr/>
+          <p:nvPr/>
+        </p:nvGrpSpPr>
+        <p:grpSpPr>
+          <a:xfrm>
+            <a:off x="-1" y="0"/>
+            <a:ext cx="8778875" cy="4834890"/>
+            <a:chOff x="878427" y="0"/>
+            <a:chExt cx="8166691" cy="4323318"/>
+          </a:xfrm>
+        </p:grpSpPr>
+        <p:pic>
+          <p:nvPicPr>
+            <p:cNvPr id="12" name="Picture 11">
+              <a:extLst>
+                <a:ext uri="{FF2B5EF4-FFF2-40B4-BE49-F238E27FC236}">
+                  <a16:creationId xmlns:a16="http://schemas.microsoft.com/office/drawing/2014/main" id="{8F2F69A7-31DC-49CF-1F73-82CBA41262C4}"/>
+                </a:ext>
+              </a:extLst>
+            </p:cNvPr>
+            <p:cNvPicPr>
+              <a:picLocks noChangeAspect="1"/>
+            </p:cNvPicPr>
+            <p:nvPr/>
+          </p:nvPicPr>
+          <p:blipFill>
+            <a:blip r:embed="rId2"/>
+            <a:stretch>
+              <a:fillRect/>
+            </a:stretch>
+          </p:blipFill>
+          <p:spPr>
+            <a:xfrm>
+              <a:off x="878427" y="0"/>
+              <a:ext cx="1712373" cy="4323318"/>
+            </a:xfrm>
+            <a:prstGeom prst="rect">
+              <a:avLst/>
+            </a:prstGeom>
+          </p:spPr>
+        </p:pic>
+        <p:pic>
+          <p:nvPicPr>
+            <p:cNvPr id="16" name="Picture 15">
+              <a:extLst>
+                <a:ext uri="{FF2B5EF4-FFF2-40B4-BE49-F238E27FC236}">
+                  <a16:creationId xmlns:a16="http://schemas.microsoft.com/office/drawing/2014/main" id="{D28A5F3C-D07A-E467-DB20-488E040DC561}"/>
+                </a:ext>
+              </a:extLst>
+            </p:cNvPr>
+            <p:cNvPicPr>
+              <a:picLocks noChangeAspect="1"/>
+            </p:cNvPicPr>
+            <p:nvPr/>
+          </p:nvPicPr>
+          <p:blipFill>
+            <a:blip r:embed="rId3"/>
+            <a:stretch>
+              <a:fillRect/>
+            </a:stretch>
+          </p:blipFill>
+          <p:spPr>
+            <a:xfrm>
+              <a:off x="2590800" y="0"/>
+              <a:ext cx="1716611" cy="4323318"/>
+            </a:xfrm>
+            <a:prstGeom prst="rect">
+              <a:avLst/>
+            </a:prstGeom>
+          </p:spPr>
+        </p:pic>
+        <p:pic>
+          <p:nvPicPr>
+            <p:cNvPr id="18" name="Picture 17">
+              <a:extLst>
+                <a:ext uri="{FF2B5EF4-FFF2-40B4-BE49-F238E27FC236}">
+                  <a16:creationId xmlns:a16="http://schemas.microsoft.com/office/drawing/2014/main" id="{DD13FA34-E932-8DB2-796D-5DC5888C7A8B}"/>
+                </a:ext>
+              </a:extLst>
+            </p:cNvPr>
+            <p:cNvPicPr>
+              <a:picLocks noChangeAspect="1"/>
+            </p:cNvPicPr>
+            <p:nvPr/>
+          </p:nvPicPr>
+          <p:blipFill rotWithShape="1">
+            <a:blip r:embed="rId4"/>
+            <a:srcRect b="2026"/>
+            <a:stretch/>
+          </p:blipFill>
+          <p:spPr>
+            <a:xfrm>
+              <a:off x="4307411" y="0"/>
+              <a:ext cx="4737707" cy="4236720"/>
+            </a:xfrm>
+            <a:prstGeom prst="rect">
+              <a:avLst/>
+            </a:prstGeom>
+          </p:spPr>
+        </p:pic>
+      </p:grpSp>
       <p:pic>
         <p:nvPicPr>
-          <p:cNvPr id="7" name="Picture 6">
+          <p:cNvPr id="14" name="Picture 13">
             <a:extLst>
               <a:ext uri="{FF2B5EF4-FFF2-40B4-BE49-F238E27FC236}">
-                <a16:creationId xmlns:a16="http://schemas.microsoft.com/office/drawing/2014/main" id="{78314BD1-DCA5-F49B-1A7D-DC7B21D0FA3B}"/>
+                <a16:creationId xmlns:a16="http://schemas.microsoft.com/office/drawing/2014/main" id="{E4AA8AA7-4A1E-5FCE-B170-8F63828039D6}"/>
               </a:ext>
             </a:extLst>
           </p:cNvPr>
@@ -2986,20 +3098,274 @@
           <p:nvPr/>
         </p:nvPicPr>
         <p:blipFill rotWithShape="1">
-          <a:blip r:embed="rId2"/>
-          <a:srcRect l="27390" t="15913" r="28376" b="7358"/>
+          <a:blip r:embed="rId5"/>
+          <a:srcRect l="14375" r="15079" b="21239"/>
           <a:stretch/>
         </p:blipFill>
         <p:spPr>
           <a:xfrm>
-            <a:off x="372028" y="22539"/>
-            <a:ext cx="1389544" cy="1683710"/>
+            <a:off x="-9678" y="2895600"/>
+            <a:ext cx="3695701" cy="2590800"/>
           </a:xfrm>
           <a:prstGeom prst="rect">
             <a:avLst/>
           </a:prstGeom>
         </p:spPr>
       </p:pic>
+      <p:sp>
+        <p:nvSpPr>
+          <p:cNvPr id="20" name="Oval 19">
+            <a:extLst>
+              <a:ext uri="{FF2B5EF4-FFF2-40B4-BE49-F238E27FC236}">
+                <a16:creationId xmlns:a16="http://schemas.microsoft.com/office/drawing/2014/main" id="{AC10DFDB-87CB-2181-F40F-69914990F01F}"/>
+              </a:ext>
+            </a:extLst>
+          </p:cNvPr>
+          <p:cNvSpPr>
+            <a:spLocks noChangeAspect="1"/>
+          </p:cNvSpPr>
+          <p:nvPr/>
+        </p:nvSpPr>
+        <p:spPr>
+          <a:xfrm>
+            <a:off x="1196044" y="1675078"/>
+            <a:ext cx="508512" cy="508512"/>
+          </a:xfrm>
+          <a:prstGeom prst="ellipse">
+            <a:avLst/>
+          </a:prstGeom>
+          <a:solidFill>
+            <a:schemeClr val="accent2">
+              <a:lumMod val="60000"/>
+              <a:lumOff val="40000"/>
+            </a:schemeClr>
+          </a:solidFill>
+          <a:ln>
+            <a:noFill/>
+          </a:ln>
+        </p:spPr>
+        <p:style>
+          <a:lnRef idx="2">
+            <a:schemeClr val="accent1">
+              <a:shade val="15000"/>
+            </a:schemeClr>
+          </a:lnRef>
+          <a:fillRef idx="1">
+            <a:schemeClr val="accent1"/>
+          </a:fillRef>
+          <a:effectRef idx="0">
+            <a:schemeClr val="accent1"/>
+          </a:effectRef>
+          <a:fontRef idx="minor">
+            <a:schemeClr val="lt1"/>
+          </a:fontRef>
+        </p:style>
+        <p:txBody>
+          <a:bodyPr tIns="72000" bIns="108000" rtlCol="0" anchor="ctr"/>
+          <a:lstStyle/>
+          <a:p>
+            <a:pPr algn="ctr"/>
+            <a:r>
+              <a:rPr lang="en-GB" sz="2400" dirty="0">
+                <a:latin typeface="Arial" panose="020B0604020202020204" pitchFamily="34" charset="0"/>
+                <a:cs typeface="Arial" panose="020B0604020202020204" pitchFamily="34" charset="0"/>
+              </a:rPr>
+              <a:t>a</a:t>
+            </a:r>
+            <a:endParaRPr lang="en-SE" sz="2400" dirty="0">
+              <a:latin typeface="Arial" panose="020B0604020202020204" pitchFamily="34" charset="0"/>
+              <a:cs typeface="Arial" panose="020B0604020202020204" pitchFamily="34" charset="0"/>
+            </a:endParaRPr>
+          </a:p>
+        </p:txBody>
+      </p:sp>
+      <p:sp>
+        <p:nvSpPr>
+          <p:cNvPr id="21" name="Oval 20">
+            <a:extLst>
+              <a:ext uri="{FF2B5EF4-FFF2-40B4-BE49-F238E27FC236}">
+                <a16:creationId xmlns:a16="http://schemas.microsoft.com/office/drawing/2014/main" id="{7B7E65E5-D0EA-1CB2-2B2F-426052726E2C}"/>
+              </a:ext>
+            </a:extLst>
+          </p:cNvPr>
+          <p:cNvSpPr>
+            <a:spLocks noChangeAspect="1"/>
+          </p:cNvSpPr>
+          <p:nvPr/>
+        </p:nvSpPr>
+        <p:spPr>
+          <a:xfrm>
+            <a:off x="789001" y="3980370"/>
+            <a:ext cx="508512" cy="508512"/>
+          </a:xfrm>
+          <a:prstGeom prst="ellipse">
+            <a:avLst/>
+          </a:prstGeom>
+          <a:solidFill>
+            <a:schemeClr val="accent2">
+              <a:lumMod val="60000"/>
+              <a:lumOff val="40000"/>
+            </a:schemeClr>
+          </a:solidFill>
+          <a:ln>
+            <a:noFill/>
+          </a:ln>
+        </p:spPr>
+        <p:style>
+          <a:lnRef idx="2">
+            <a:schemeClr val="accent1">
+              <a:shade val="15000"/>
+            </a:schemeClr>
+          </a:lnRef>
+          <a:fillRef idx="1">
+            <a:schemeClr val="accent1"/>
+          </a:fillRef>
+          <a:effectRef idx="0">
+            <a:schemeClr val="accent1"/>
+          </a:effectRef>
+          <a:fontRef idx="minor">
+            <a:schemeClr val="lt1"/>
+          </a:fontRef>
+        </p:style>
+        <p:txBody>
+          <a:bodyPr tIns="72000" bIns="108000" rtlCol="0" anchor="ctr"/>
+          <a:lstStyle/>
+          <a:p>
+            <a:pPr algn="ctr"/>
+            <a:r>
+              <a:rPr lang="en-GB" sz="2400" dirty="0">
+                <a:latin typeface="Arial" panose="020B0604020202020204" pitchFamily="34" charset="0"/>
+                <a:cs typeface="Arial" panose="020B0604020202020204" pitchFamily="34" charset="0"/>
+              </a:rPr>
+              <a:t>b</a:t>
+            </a:r>
+            <a:endParaRPr lang="en-SE" sz="2400" dirty="0">
+              <a:latin typeface="Arial" panose="020B0604020202020204" pitchFamily="34" charset="0"/>
+              <a:cs typeface="Arial" panose="020B0604020202020204" pitchFamily="34" charset="0"/>
+            </a:endParaRPr>
+          </a:p>
+        </p:txBody>
+      </p:sp>
+      <p:sp>
+        <p:nvSpPr>
+          <p:cNvPr id="23" name="Rectangle 22">
+            <a:extLst>
+              <a:ext uri="{FF2B5EF4-FFF2-40B4-BE49-F238E27FC236}">
+                <a16:creationId xmlns:a16="http://schemas.microsoft.com/office/drawing/2014/main" id="{AA915A41-DEA3-900C-2E51-A06B46EC80CF}"/>
+              </a:ext>
+            </a:extLst>
+          </p:cNvPr>
+          <p:cNvSpPr/>
+          <p:nvPr/>
+        </p:nvSpPr>
+        <p:spPr>
+          <a:xfrm>
+            <a:off x="1866814" y="2562214"/>
+            <a:ext cx="1729054" cy="292746"/>
+          </a:xfrm>
+          <a:prstGeom prst="rect">
+            <a:avLst/>
+          </a:prstGeom>
+          <a:noFill/>
+          <a:ln w="28575">
+            <a:solidFill>
+              <a:srgbClr val="F4B183"/>
+            </a:solidFill>
+            <a:prstDash val="sysDot"/>
+          </a:ln>
+        </p:spPr>
+        <p:style>
+          <a:lnRef idx="2">
+            <a:schemeClr val="accent1">
+              <a:shade val="15000"/>
+            </a:schemeClr>
+          </a:lnRef>
+          <a:fillRef idx="1">
+            <a:schemeClr val="accent1"/>
+          </a:fillRef>
+          <a:effectRef idx="0">
+            <a:schemeClr val="accent1"/>
+          </a:effectRef>
+          <a:fontRef idx="minor">
+            <a:schemeClr val="lt1"/>
+          </a:fontRef>
+        </p:style>
+        <p:txBody>
+          <a:bodyPr rtlCol="0" anchor="ctr"/>
+          <a:lstStyle/>
+          <a:p>
+            <a:pPr algn="ctr"/>
+            <a:endParaRPr lang="en-SE"/>
+          </a:p>
+        </p:txBody>
+      </p:sp>
+      <p:sp>
+        <p:nvSpPr>
+          <p:cNvPr id="22" name="Oval 21">
+            <a:extLst>
+              <a:ext uri="{FF2B5EF4-FFF2-40B4-BE49-F238E27FC236}">
+                <a16:creationId xmlns:a16="http://schemas.microsoft.com/office/drawing/2014/main" id="{7735833B-C1B4-9944-99B2-A184DAAFFE76}"/>
+              </a:ext>
+            </a:extLst>
+          </p:cNvPr>
+          <p:cNvSpPr>
+            <a:spLocks noChangeAspect="1"/>
+          </p:cNvSpPr>
+          <p:nvPr/>
+        </p:nvSpPr>
+        <p:spPr>
+          <a:xfrm>
+            <a:off x="3036778" y="2163189"/>
+            <a:ext cx="508512" cy="508512"/>
+          </a:xfrm>
+          <a:prstGeom prst="ellipse">
+            <a:avLst/>
+          </a:prstGeom>
+          <a:solidFill>
+            <a:schemeClr val="accent2">
+              <a:lumMod val="60000"/>
+              <a:lumOff val="40000"/>
+            </a:schemeClr>
+          </a:solidFill>
+          <a:ln>
+            <a:noFill/>
+          </a:ln>
+        </p:spPr>
+        <p:style>
+          <a:lnRef idx="2">
+            <a:schemeClr val="accent1">
+              <a:shade val="15000"/>
+            </a:schemeClr>
+          </a:lnRef>
+          <a:fillRef idx="1">
+            <a:schemeClr val="accent1"/>
+          </a:fillRef>
+          <a:effectRef idx="0">
+            <a:schemeClr val="accent1"/>
+          </a:effectRef>
+          <a:fontRef idx="minor">
+            <a:schemeClr val="lt1"/>
+          </a:fontRef>
+        </p:style>
+        <p:txBody>
+          <a:bodyPr tIns="72000" bIns="108000" rtlCol="0" anchor="ctr"/>
+          <a:lstStyle/>
+          <a:p>
+            <a:pPr algn="ctr"/>
+            <a:r>
+              <a:rPr lang="en-GB" sz="2400" dirty="0">
+                <a:latin typeface="Arial" panose="020B0604020202020204" pitchFamily="34" charset="0"/>
+                <a:cs typeface="Arial" panose="020B0604020202020204" pitchFamily="34" charset="0"/>
+              </a:rPr>
+              <a:t>c</a:t>
+            </a:r>
+            <a:endParaRPr lang="en-SE" sz="2400" dirty="0">
+              <a:latin typeface="Arial" panose="020B0604020202020204" pitchFamily="34" charset="0"/>
+              <a:cs typeface="Arial" panose="020B0604020202020204" pitchFamily="34" charset="0"/>
+            </a:endParaRPr>
+          </a:p>
+        </p:txBody>
+      </p:sp>
     </p:spTree>
     <p:extLst>
       <p:ext uri="{BB962C8B-B14F-4D97-AF65-F5344CB8AC3E}">

</xml_diff>